<commit_message>
evaluation of chosen model
</commit_message>
<xml_diff>
--- a/Presentation1.pptx
+++ b/Presentation1.pptx
@@ -10,8 +10,9 @@
     <p:sldId id="263" r:id="rId4"/>
     <p:sldId id="264" r:id="rId5"/>
     <p:sldId id="259" r:id="rId6"/>
-    <p:sldId id="260" r:id="rId7"/>
-    <p:sldId id="261" r:id="rId8"/>
+    <p:sldId id="265" r:id="rId7"/>
+    <p:sldId id="260" r:id="rId8"/>
+    <p:sldId id="261" r:id="rId9"/>
   </p:sldIdLst>
   <p:sldSz cx="12192000" cy="6858000"/>
   <p:notesSz cx="6858000" cy="9144000"/>
@@ -306,7 +307,7 @@
           <a:p>
             <a:fld id="{25EF3B13-7E36-4CB1-A31A-4FE272CD73E2}" type="datetimeFigureOut">
               <a:rPr lang="en-US" smtClean="0"/>
-              <a:t>10/30/2023</a:t>
+              <a:t>11/1/2023</a:t>
             </a:fld>
             <a:endParaRPr lang="en-US"/>
           </a:p>
@@ -644,7 +645,7 @@
           <a:p>
             <a:fld id="{25EF3B13-7E36-4CB1-A31A-4FE272CD73E2}" type="datetimeFigureOut">
               <a:rPr lang="en-US" smtClean="0"/>
-              <a:t>10/30/2023</a:t>
+              <a:t>11/1/2023</a:t>
             </a:fld>
             <a:endParaRPr lang="en-US"/>
           </a:p>
@@ -1045,7 +1046,7 @@
           <a:p>
             <a:fld id="{25EF3B13-7E36-4CB1-A31A-4FE272CD73E2}" type="datetimeFigureOut">
               <a:rPr lang="en-US" smtClean="0"/>
-              <a:t>10/30/2023</a:t>
+              <a:t>11/1/2023</a:t>
             </a:fld>
             <a:endParaRPr lang="en-US"/>
           </a:p>
@@ -1381,7 +1382,7 @@
           <a:p>
             <a:fld id="{25EF3B13-7E36-4CB1-A31A-4FE272CD73E2}" type="datetimeFigureOut">
               <a:rPr lang="en-US" smtClean="0"/>
-              <a:t>10/30/2023</a:t>
+              <a:t>11/1/2023</a:t>
             </a:fld>
             <a:endParaRPr lang="en-US"/>
           </a:p>
@@ -1701,7 +1702,7 @@
           <a:p>
             <a:fld id="{25EF3B13-7E36-4CB1-A31A-4FE272CD73E2}" type="datetimeFigureOut">
               <a:rPr lang="en-US" smtClean="0"/>
-              <a:t>10/30/2023</a:t>
+              <a:t>11/1/2023</a:t>
             </a:fld>
             <a:endParaRPr lang="en-US"/>
           </a:p>
@@ -2097,7 +2098,7 @@
           <a:p>
             <a:fld id="{25EF3B13-7E36-4CB1-A31A-4FE272CD73E2}" type="datetimeFigureOut">
               <a:rPr lang="en-US" smtClean="0"/>
-              <a:t>10/30/2023</a:t>
+              <a:t>11/1/2023</a:t>
             </a:fld>
             <a:endParaRPr lang="en-US"/>
           </a:p>
@@ -2354,7 +2355,7 @@
           <a:p>
             <a:fld id="{25EF3B13-7E36-4CB1-A31A-4FE272CD73E2}" type="datetimeFigureOut">
               <a:rPr lang="en-US" smtClean="0"/>
-              <a:t>10/30/2023</a:t>
+              <a:t>11/1/2023</a:t>
             </a:fld>
             <a:endParaRPr lang="en-US"/>
           </a:p>
@@ -2616,7 +2617,7 @@
           <a:p>
             <a:fld id="{25EF3B13-7E36-4CB1-A31A-4FE272CD73E2}" type="datetimeFigureOut">
               <a:rPr lang="en-US" smtClean="0"/>
-              <a:t>10/30/2023</a:t>
+              <a:t>11/1/2023</a:t>
             </a:fld>
             <a:endParaRPr lang="en-US"/>
           </a:p>
@@ -2878,7 +2879,7 @@
           <a:p>
             <a:fld id="{25EF3B13-7E36-4CB1-A31A-4FE272CD73E2}" type="datetimeFigureOut">
               <a:rPr lang="en-US" smtClean="0"/>
-              <a:t>10/30/2023</a:t>
+              <a:t>11/1/2023</a:t>
             </a:fld>
             <a:endParaRPr lang="en-US"/>
           </a:p>
@@ -3207,7 +3208,7 @@
           <a:p>
             <a:fld id="{25EF3B13-7E36-4CB1-A31A-4FE272CD73E2}" type="datetimeFigureOut">
               <a:rPr lang="en-US" smtClean="0"/>
-              <a:t>10/30/2023</a:t>
+              <a:t>11/1/2023</a:t>
             </a:fld>
             <a:endParaRPr lang="en-US"/>
           </a:p>
@@ -3530,7 +3531,7 @@
           <a:p>
             <a:fld id="{25EF3B13-7E36-4CB1-A31A-4FE272CD73E2}" type="datetimeFigureOut">
               <a:rPr lang="en-US" smtClean="0"/>
-              <a:t>10/30/2023</a:t>
+              <a:t>11/1/2023</a:t>
             </a:fld>
             <a:endParaRPr lang="en-US"/>
           </a:p>
@@ -3987,7 +3988,7 @@
           <a:p>
             <a:fld id="{25EF3B13-7E36-4CB1-A31A-4FE272CD73E2}" type="datetimeFigureOut">
               <a:rPr lang="en-US" smtClean="0"/>
-              <a:t>10/30/2023</a:t>
+              <a:t>11/1/2023</a:t>
             </a:fld>
             <a:endParaRPr lang="en-US"/>
           </a:p>
@@ -4192,7 +4193,7 @@
           <a:p>
             <a:fld id="{25EF3B13-7E36-4CB1-A31A-4FE272CD73E2}" type="datetimeFigureOut">
               <a:rPr lang="en-US" smtClean="0"/>
-              <a:t>10/30/2023</a:t>
+              <a:t>11/1/2023</a:t>
             </a:fld>
             <a:endParaRPr lang="en-US"/>
           </a:p>
@@ -4369,7 +4370,7 @@
           <a:p>
             <a:fld id="{25EF3B13-7E36-4CB1-A31A-4FE272CD73E2}" type="datetimeFigureOut">
               <a:rPr lang="en-US" smtClean="0"/>
-              <a:t>10/30/2023</a:t>
+              <a:t>11/1/2023</a:t>
             </a:fld>
             <a:endParaRPr lang="en-US"/>
           </a:p>
@@ -4702,7 +4703,7 @@
           <a:p>
             <a:fld id="{25EF3B13-7E36-4CB1-A31A-4FE272CD73E2}" type="datetimeFigureOut">
               <a:rPr lang="en-US" smtClean="0"/>
-              <a:t>10/30/2023</a:t>
+              <a:t>11/1/2023</a:t>
             </a:fld>
             <a:endParaRPr lang="en-US"/>
           </a:p>
@@ -5047,7 +5048,7 @@
           <a:p>
             <a:fld id="{25EF3B13-7E36-4CB1-A31A-4FE272CD73E2}" type="datetimeFigureOut">
               <a:rPr lang="en-US" smtClean="0"/>
-              <a:t>10/30/2023</a:t>
+              <a:t>11/1/2023</a:t>
             </a:fld>
             <a:endParaRPr lang="en-US"/>
           </a:p>
@@ -7164,7 +7165,7 @@
           <a:p>
             <a:fld id="{25EF3B13-7E36-4CB1-A31A-4FE272CD73E2}" type="datetimeFigureOut">
               <a:rPr lang="en-US" smtClean="0"/>
-              <a:t>10/30/2023</a:t>
+              <a:t>11/1/2023</a:t>
             </a:fld>
             <a:endParaRPr lang="en-US"/>
           </a:p>
@@ -7910,7 +7911,7 @@
         </p:nvSpPr>
         <p:spPr>
           <a:xfrm>
-            <a:off x="1705947" y="570403"/>
+            <a:off x="1705947" y="580794"/>
             <a:ext cx="10515600" cy="1325563"/>
           </a:xfrm>
         </p:spPr>
@@ -7955,18 +7956,6 @@
           <a:p>
             <a:r>
               <a:rPr lang="en-US" sz="2400" dirty="0"/>
-              <a:t>The data comes from Drugs.com and is accessed through UCI's website.</a:t>
-            </a:r>
-          </a:p>
-          <a:p>
-            <a:pPr marL="0" indent="0">
-              <a:buNone/>
-            </a:pPr>
-            <a:endParaRPr lang="en-US" sz="2400" dirty="0"/>
-          </a:p>
-          <a:p>
-            <a:r>
-              <a:rPr lang="en-US" sz="2400" dirty="0"/>
               <a:t>160,000 samples</a:t>
             </a:r>
           </a:p>
@@ -7980,7 +7969,7 @@
             <a:pPr lvl="1"/>
             <a:r>
               <a:rPr lang="en-US" sz="2200" dirty="0"/>
-              <a:t>800 unique conditions and </a:t>
+              <a:t>800 and 3400 unique conditions</a:t>
             </a:r>
           </a:p>
           <a:p>
@@ -7989,7 +7978,7 @@
             </a:pPr>
             <a:r>
               <a:rPr lang="en-US" sz="2200" dirty="0"/>
-              <a:t>3400 unique drugs</a:t>
+              <a:t>and drugs</a:t>
             </a:r>
           </a:p>
           <a:p>
@@ -8014,6 +8003,47 @@
               <a:t>deta</a:t>
             </a:r>
             <a:endParaRPr lang="en-US" sz="2400" dirty="0"/>
+          </a:p>
+          <a:p>
+            <a:endParaRPr lang="en-US" sz="2400" dirty="0"/>
+          </a:p>
+          <a:p>
+            <a:r>
+              <a:rPr lang="en-US" sz="1200" dirty="0"/>
+              <a:t>The data comes from Drugs.com and is accessed through UCI's website.</a:t>
+            </a:r>
+          </a:p>
+          <a:p>
+            <a:pPr marL="0" indent="0">
+              <a:buNone/>
+            </a:pPr>
+            <a:r>
+              <a:rPr lang="en-US" sz="1200" dirty="0"/>
+              <a:t> </a:t>
+            </a:r>
+            <a:r>
+              <a:rPr lang="en-US" sz="800" dirty="0"/>
+              <a:t>(</a:t>
+            </a:r>
+            <a:r>
+              <a:rPr lang="en-US" sz="800" dirty="0" err="1"/>
+              <a:t>Kalummadi</a:t>
+            </a:r>
+            <a:r>
+              <a:rPr lang="en-US" sz="800" dirty="0"/>
+              <a:t> and </a:t>
+            </a:r>
+            <a:r>
+              <a:rPr lang="en-US" sz="800" dirty="0" err="1"/>
+              <a:t>Grer</a:t>
+            </a:r>
+            <a:r>
+              <a:rPr lang="en-US" sz="800" dirty="0"/>
+              <a:t>)</a:t>
+            </a:r>
+          </a:p>
+          <a:p>
+            <a:endParaRPr lang="en-US" sz="1200" dirty="0"/>
           </a:p>
         </p:txBody>
       </p:sp>
@@ -8402,7 +8432,7 @@
         </p:nvSpPr>
         <p:spPr>
           <a:xfrm>
-            <a:off x="5612163" y="5112050"/>
+            <a:off x="7305881" y="4145694"/>
             <a:ext cx="4621810" cy="830997"/>
           </a:xfrm>
           <a:prstGeom prst="rect">
@@ -8418,7 +8448,7 @@
           <a:p>
             <a:r>
               <a:rPr lang="en-US" sz="2400" dirty="0"/>
-              <a:t>Queen is to king as women is to man.</a:t>
+              <a:t>(Queen is to king as women is to man.)	</a:t>
             </a:r>
           </a:p>
         </p:txBody>
@@ -8502,7 +8532,12 @@
             <p:ph idx="1"/>
           </p:nvPr>
         </p:nvSpPr>
-        <p:spPr/>
+        <p:spPr>
+          <a:xfrm>
+            <a:off x="2589212" y="2143991"/>
+            <a:ext cx="8915400" cy="3777622"/>
+          </a:xfrm>
+        </p:spPr>
         <p:txBody>
           <a:bodyPr>
             <a:normAutofit/>
@@ -8511,7 +8546,7 @@
           <a:p>
             <a:r>
               <a:rPr lang="en-US" sz="2400" dirty="0"/>
-              <a:t>Linear regression  model performs best.</a:t>
+              <a:t>Linear regression  model performs best.		</a:t>
             </a:r>
           </a:p>
         </p:txBody>
@@ -9011,6 +9046,217 @@
           <p:cNvPr id="2" name="Title 1">
             <a:extLst>
               <a:ext uri="{FF2B5EF4-FFF2-40B4-BE49-F238E27FC236}">
+                <a16:creationId xmlns:a16="http://schemas.microsoft.com/office/drawing/2014/main" id="{3FFF6916-D38A-B65D-0C1F-B5B449275A9B}"/>
+              </a:ext>
+            </a:extLst>
+          </p:cNvPr>
+          <p:cNvSpPr>
+            <a:spLocks noGrp="1"/>
+          </p:cNvSpPr>
+          <p:nvPr>
+            <p:ph type="title"/>
+          </p:nvPr>
+        </p:nvSpPr>
+        <p:spPr/>
+        <p:txBody>
+          <a:bodyPr/>
+          <a:lstStyle/>
+          <a:p>
+            <a:r>
+              <a:rPr lang="en-US" dirty="0"/>
+              <a:t>Evaluation of chosen model</a:t>
+            </a:r>
+          </a:p>
+        </p:txBody>
+      </p:sp>
+      <p:graphicFrame>
+        <p:nvGraphicFramePr>
+          <p:cNvPr id="4" name="Content Placeholder 3">
+            <a:extLst>
+              <a:ext uri="{FF2B5EF4-FFF2-40B4-BE49-F238E27FC236}">
+                <a16:creationId xmlns:a16="http://schemas.microsoft.com/office/drawing/2014/main" id="{430F0D58-753A-094E-7E9A-6826EC11C8A2}"/>
+              </a:ext>
+            </a:extLst>
+          </p:cNvPr>
+          <p:cNvGraphicFramePr>
+            <a:graphicFrameLocks noGrp="1"/>
+          </p:cNvGraphicFramePr>
+          <p:nvPr>
+            <p:ph idx="1"/>
+            <p:extLst>
+              <p:ext uri="{D42A27DB-BD31-4B8C-83A1-F6EECF244321}">
+                <p14:modId xmlns:p14="http://schemas.microsoft.com/office/powerpoint/2010/main" val="2416232972"/>
+              </p:ext>
+            </p:extLst>
+          </p:nvPr>
+        </p:nvGraphicFramePr>
+        <p:xfrm>
+          <a:off x="2589213" y="2133600"/>
+          <a:ext cx="8915400" cy="2164080"/>
+        </p:xfrm>
+        <a:graphic>
+          <a:graphicData uri="http://schemas.openxmlformats.org/drawingml/2006/table">
+            <a:tbl>
+              <a:tblPr firstRow="1" bandRow="1">
+                <a:tableStyleId>{5C22544A-7EE6-4342-B048-85BDC9FD1C3A}</a:tableStyleId>
+              </a:tblPr>
+              <a:tblGrid>
+                <a:gridCol w="2971800">
+                  <a:extLst>
+                    <a:ext uri="{9D8B030D-6E8A-4147-A177-3AD203B41FA5}">
+                      <a16:colId xmlns:a16="http://schemas.microsoft.com/office/drawing/2014/main" val="916919713"/>
+                    </a:ext>
+                  </a:extLst>
+                </a:gridCol>
+                <a:gridCol w="2971800">
+                  <a:extLst>
+                    <a:ext uri="{9D8B030D-6E8A-4147-A177-3AD203B41FA5}">
+                      <a16:colId xmlns:a16="http://schemas.microsoft.com/office/drawing/2014/main" val="1274554379"/>
+                    </a:ext>
+                  </a:extLst>
+                </a:gridCol>
+                <a:gridCol w="2971800">
+                  <a:extLst>
+                    <a:ext uri="{9D8B030D-6E8A-4147-A177-3AD203B41FA5}">
+                      <a16:colId xmlns:a16="http://schemas.microsoft.com/office/drawing/2014/main" val="1156449383"/>
+                    </a:ext>
+                  </a:extLst>
+                </a:gridCol>
+              </a:tblGrid>
+              <a:tr h="370840">
+                <a:tc>
+                  <a:txBody>
+                    <a:bodyPr/>
+                    <a:lstStyle/>
+                    <a:p>
+                      <a:r>
+                        <a:rPr lang="en-US" sz="2600" dirty="0"/>
+                        <a:t>Linear Regression with TF-IDF</a:t>
+                      </a:r>
+                    </a:p>
+                  </a:txBody>
+                  <a:tcPr/>
+                </a:tc>
+                <a:tc>
+                  <a:txBody>
+                    <a:bodyPr/>
+                    <a:lstStyle/>
+                    <a:p>
+                      <a:r>
+                        <a:rPr lang="en-US" sz="2600" dirty="0"/>
+                        <a:t>MSE</a:t>
+                      </a:r>
+                    </a:p>
+                  </a:txBody>
+                  <a:tcPr/>
+                </a:tc>
+                <a:tc>
+                  <a:txBody>
+                    <a:bodyPr/>
+                    <a:lstStyle/>
+                    <a:p>
+                      <a:r>
+                        <a:rPr lang="en-US" sz="2600" dirty="0"/>
+                        <a:t>RMSE</a:t>
+                      </a:r>
+                    </a:p>
+                  </a:txBody>
+                  <a:tcPr/>
+                </a:tc>
+                <a:extLst>
+                  <a:ext uri="{0D108BD9-81ED-4DB2-BD59-A6C34878D82A}">
+                    <a16:rowId xmlns:a16="http://schemas.microsoft.com/office/drawing/2014/main" val="163432603"/>
+                  </a:ext>
+                </a:extLst>
+              </a:tr>
+              <a:tr h="370840">
+                <a:tc>
+                  <a:txBody>
+                    <a:bodyPr/>
+                    <a:lstStyle/>
+                    <a:p>
+                      <a:endParaRPr lang="en-US" sz="2600"/>
+                    </a:p>
+                  </a:txBody>
+                  <a:tcPr/>
+                </a:tc>
+                <a:tc>
+                  <a:txBody>
+                    <a:bodyPr/>
+                    <a:lstStyle/>
+                    <a:p>
+                      <a:r>
+                        <a:rPr lang="en-US" sz="2600" dirty="0"/>
+                        <a:t>8.3</a:t>
+                      </a:r>
+                    </a:p>
+                  </a:txBody>
+                  <a:tcPr/>
+                </a:tc>
+                <a:tc>
+                  <a:txBody>
+                    <a:bodyPr/>
+                    <a:lstStyle/>
+                    <a:p>
+                      <a:r>
+                        <a:rPr lang="en-US" sz="2600" dirty="0"/>
+                        <a:t>2.9</a:t>
+                      </a:r>
+                    </a:p>
+                    <a:p>
+                      <a:endParaRPr lang="en-US" sz="2600" dirty="0"/>
+                    </a:p>
+                    <a:p>
+                      <a:endParaRPr lang="en-US" sz="2600" dirty="0"/>
+                    </a:p>
+                  </a:txBody>
+                  <a:tcPr/>
+                </a:tc>
+                <a:extLst>
+                  <a:ext uri="{0D108BD9-81ED-4DB2-BD59-A6C34878D82A}">
+                    <a16:rowId xmlns:a16="http://schemas.microsoft.com/office/drawing/2014/main" val="3605101688"/>
+                  </a:ext>
+                </a:extLst>
+              </a:tr>
+            </a:tbl>
+          </a:graphicData>
+        </a:graphic>
+      </p:graphicFrame>
+    </p:spTree>
+    <p:extLst>
+      <p:ext uri="{BB962C8B-B14F-4D97-AF65-F5344CB8AC3E}">
+        <p14:creationId xmlns:p14="http://schemas.microsoft.com/office/powerpoint/2010/main" val="935880193"/>
+      </p:ext>
+    </p:extLst>
+  </p:cSld>
+  <p:clrMapOvr>
+    <a:masterClrMapping/>
+  </p:clrMapOvr>
+</p:sld>
+</file>
+
+<file path=ppt/slides/slide7.xml><?xml version="1.0" encoding="utf-8"?>
+<p:sld xmlns:a="http://schemas.openxmlformats.org/drawingml/2006/main" xmlns:r="http://schemas.openxmlformats.org/officeDocument/2006/relationships" xmlns:p="http://schemas.openxmlformats.org/presentationml/2006/main">
+  <p:cSld>
+    <p:spTree>
+      <p:nvGrpSpPr>
+        <p:cNvPr id="1" name=""/>
+        <p:cNvGrpSpPr/>
+        <p:nvPr/>
+      </p:nvGrpSpPr>
+      <p:grpSpPr>
+        <a:xfrm>
+          <a:off x="0" y="0"/>
+          <a:ext cx="0" cy="0"/>
+          <a:chOff x="0" y="0"/>
+          <a:chExt cx="0" cy="0"/>
+        </a:xfrm>
+      </p:grpSpPr>
+      <p:sp>
+        <p:nvSpPr>
+          <p:cNvPr id="2" name="Title 1">
+            <a:extLst>
+              <a:ext uri="{FF2B5EF4-FFF2-40B4-BE49-F238E27FC236}">
                 <a16:creationId xmlns:a16="http://schemas.microsoft.com/office/drawing/2014/main" id="{29F9C024-232F-1F60-3B4A-12E3BD0A8AE2}"/>
               </a:ext>
             </a:extLst>
@@ -9069,7 +9315,7 @@
           <a:p>
             <a:r>
               <a:rPr lang="en-US" sz="2400" dirty="0"/>
-              <a:t>Deployment of baseline model</a:t>
+              <a:t>Deployment of linear regression model</a:t>
             </a:r>
           </a:p>
           <a:p>
@@ -9135,7 +9381,7 @@
 </p:sld>
 </file>
 
-<file path=ppt/slides/slide7.xml><?xml version="1.0" encoding="utf-8"?>
+<file path=ppt/slides/slide8.xml><?xml version="1.0" encoding="utf-8"?>
 <p:sld xmlns:a="http://schemas.openxmlformats.org/drawingml/2006/main" xmlns:r="http://schemas.openxmlformats.org/officeDocument/2006/relationships" xmlns:p="http://schemas.openxmlformats.org/presentationml/2006/main">
   <p:cSld>
     <p:spTree>

</xml_diff>

<commit_message>
markdown, code comments, recommendations, preprocessing, links
</commit_message>
<xml_diff>
--- a/Presentation1.pptx
+++ b/Presentation1.pptx
@@ -307,7 +307,7 @@
           <a:p>
             <a:fld id="{25EF3B13-7E36-4CB1-A31A-4FE272CD73E2}" type="datetimeFigureOut">
               <a:rPr lang="en-US" smtClean="0"/>
-              <a:t>11/1/2023</a:t>
+              <a:t>11/28/2023</a:t>
             </a:fld>
             <a:endParaRPr lang="en-US"/>
           </a:p>
@@ -645,7 +645,7 @@
           <a:p>
             <a:fld id="{25EF3B13-7E36-4CB1-A31A-4FE272CD73E2}" type="datetimeFigureOut">
               <a:rPr lang="en-US" smtClean="0"/>
-              <a:t>11/1/2023</a:t>
+              <a:t>11/28/2023</a:t>
             </a:fld>
             <a:endParaRPr lang="en-US"/>
           </a:p>
@@ -1046,7 +1046,7 @@
           <a:p>
             <a:fld id="{25EF3B13-7E36-4CB1-A31A-4FE272CD73E2}" type="datetimeFigureOut">
               <a:rPr lang="en-US" smtClean="0"/>
-              <a:t>11/1/2023</a:t>
+              <a:t>11/28/2023</a:t>
             </a:fld>
             <a:endParaRPr lang="en-US"/>
           </a:p>
@@ -1382,7 +1382,7 @@
           <a:p>
             <a:fld id="{25EF3B13-7E36-4CB1-A31A-4FE272CD73E2}" type="datetimeFigureOut">
               <a:rPr lang="en-US" smtClean="0"/>
-              <a:t>11/1/2023</a:t>
+              <a:t>11/28/2023</a:t>
             </a:fld>
             <a:endParaRPr lang="en-US"/>
           </a:p>
@@ -1702,7 +1702,7 @@
           <a:p>
             <a:fld id="{25EF3B13-7E36-4CB1-A31A-4FE272CD73E2}" type="datetimeFigureOut">
               <a:rPr lang="en-US" smtClean="0"/>
-              <a:t>11/1/2023</a:t>
+              <a:t>11/28/2023</a:t>
             </a:fld>
             <a:endParaRPr lang="en-US"/>
           </a:p>
@@ -2098,7 +2098,7 @@
           <a:p>
             <a:fld id="{25EF3B13-7E36-4CB1-A31A-4FE272CD73E2}" type="datetimeFigureOut">
               <a:rPr lang="en-US" smtClean="0"/>
-              <a:t>11/1/2023</a:t>
+              <a:t>11/28/2023</a:t>
             </a:fld>
             <a:endParaRPr lang="en-US"/>
           </a:p>
@@ -2355,7 +2355,7 @@
           <a:p>
             <a:fld id="{25EF3B13-7E36-4CB1-A31A-4FE272CD73E2}" type="datetimeFigureOut">
               <a:rPr lang="en-US" smtClean="0"/>
-              <a:t>11/1/2023</a:t>
+              <a:t>11/28/2023</a:t>
             </a:fld>
             <a:endParaRPr lang="en-US"/>
           </a:p>
@@ -2617,7 +2617,7 @@
           <a:p>
             <a:fld id="{25EF3B13-7E36-4CB1-A31A-4FE272CD73E2}" type="datetimeFigureOut">
               <a:rPr lang="en-US" smtClean="0"/>
-              <a:t>11/1/2023</a:t>
+              <a:t>11/28/2023</a:t>
             </a:fld>
             <a:endParaRPr lang="en-US"/>
           </a:p>
@@ -2879,7 +2879,7 @@
           <a:p>
             <a:fld id="{25EF3B13-7E36-4CB1-A31A-4FE272CD73E2}" type="datetimeFigureOut">
               <a:rPr lang="en-US" smtClean="0"/>
-              <a:t>11/1/2023</a:t>
+              <a:t>11/28/2023</a:t>
             </a:fld>
             <a:endParaRPr lang="en-US"/>
           </a:p>
@@ -3208,7 +3208,7 @@
           <a:p>
             <a:fld id="{25EF3B13-7E36-4CB1-A31A-4FE272CD73E2}" type="datetimeFigureOut">
               <a:rPr lang="en-US" smtClean="0"/>
-              <a:t>11/1/2023</a:t>
+              <a:t>11/28/2023</a:t>
             </a:fld>
             <a:endParaRPr lang="en-US"/>
           </a:p>
@@ -3531,7 +3531,7 @@
           <a:p>
             <a:fld id="{25EF3B13-7E36-4CB1-A31A-4FE272CD73E2}" type="datetimeFigureOut">
               <a:rPr lang="en-US" smtClean="0"/>
-              <a:t>11/1/2023</a:t>
+              <a:t>11/28/2023</a:t>
             </a:fld>
             <a:endParaRPr lang="en-US"/>
           </a:p>
@@ -3988,7 +3988,7 @@
           <a:p>
             <a:fld id="{25EF3B13-7E36-4CB1-A31A-4FE272CD73E2}" type="datetimeFigureOut">
               <a:rPr lang="en-US" smtClean="0"/>
-              <a:t>11/1/2023</a:t>
+              <a:t>11/28/2023</a:t>
             </a:fld>
             <a:endParaRPr lang="en-US"/>
           </a:p>
@@ -4193,7 +4193,7 @@
           <a:p>
             <a:fld id="{25EF3B13-7E36-4CB1-A31A-4FE272CD73E2}" type="datetimeFigureOut">
               <a:rPr lang="en-US" smtClean="0"/>
-              <a:t>11/1/2023</a:t>
+              <a:t>11/28/2023</a:t>
             </a:fld>
             <a:endParaRPr lang="en-US"/>
           </a:p>
@@ -4370,7 +4370,7 @@
           <a:p>
             <a:fld id="{25EF3B13-7E36-4CB1-A31A-4FE272CD73E2}" type="datetimeFigureOut">
               <a:rPr lang="en-US" smtClean="0"/>
-              <a:t>11/1/2023</a:t>
+              <a:t>11/28/2023</a:t>
             </a:fld>
             <a:endParaRPr lang="en-US"/>
           </a:p>
@@ -4703,7 +4703,7 @@
           <a:p>
             <a:fld id="{25EF3B13-7E36-4CB1-A31A-4FE272CD73E2}" type="datetimeFigureOut">
               <a:rPr lang="en-US" smtClean="0"/>
-              <a:t>11/1/2023</a:t>
+              <a:t>11/28/2023</a:t>
             </a:fld>
             <a:endParaRPr lang="en-US"/>
           </a:p>
@@ -5048,7 +5048,7 @@
           <a:p>
             <a:fld id="{25EF3B13-7E36-4CB1-A31A-4FE272CD73E2}" type="datetimeFigureOut">
               <a:rPr lang="en-US" smtClean="0"/>
-              <a:t>11/1/2023</a:t>
+              <a:t>11/28/2023</a:t>
             </a:fld>
             <a:endParaRPr lang="en-US"/>
           </a:p>
@@ -7165,7 +7165,7 @@
           <a:p>
             <a:fld id="{25EF3B13-7E36-4CB1-A31A-4FE272CD73E2}" type="datetimeFigureOut">
               <a:rPr lang="en-US" smtClean="0"/>
-              <a:t>11/1/2023</a:t>
+              <a:t>11/28/2023</a:t>
             </a:fld>
             <a:endParaRPr lang="en-US"/>
           </a:p>
@@ -8083,6 +8083,76 @@
           </a:prstGeom>
         </p:spPr>
       </p:pic>
+      <p:sp>
+        <p:nvSpPr>
+          <p:cNvPr id="4" name="TextBox 3">
+            <a:extLst>
+              <a:ext uri="{FF2B5EF4-FFF2-40B4-BE49-F238E27FC236}">
+                <a16:creationId xmlns:a16="http://schemas.microsoft.com/office/drawing/2014/main" id="{3D74542F-1E8E-F9B3-C01B-3C97C0B6DE72}"/>
+              </a:ext>
+            </a:extLst>
+          </p:cNvPr>
+          <p:cNvSpPr txBox="1"/>
+          <p:nvPr/>
+        </p:nvSpPr>
+        <p:spPr>
+          <a:xfrm>
+            <a:off x="8201029" y="2363932"/>
+            <a:ext cx="2156108" cy="369332"/>
+          </a:xfrm>
+          <a:prstGeom prst="rect">
+            <a:avLst/>
+          </a:prstGeom>
+          <a:noFill/>
+        </p:spPr>
+        <p:txBody>
+          <a:bodyPr wrap="square" rtlCol="0">
+            <a:spAutoFit/>
+          </a:bodyPr>
+          <a:lstStyle/>
+          <a:p>
+            <a:r>
+              <a:rPr lang="en-US" dirty="0"/>
+              <a:t>Patient ratings</a:t>
+            </a:r>
+          </a:p>
+        </p:txBody>
+      </p:sp>
+      <p:sp>
+        <p:nvSpPr>
+          <p:cNvPr id="5" name="TextBox 4">
+            <a:extLst>
+              <a:ext uri="{FF2B5EF4-FFF2-40B4-BE49-F238E27FC236}">
+                <a16:creationId xmlns:a16="http://schemas.microsoft.com/office/drawing/2014/main" id="{F35785AF-1F06-FF35-8D93-B131733217CE}"/>
+              </a:ext>
+            </a:extLst>
+          </p:cNvPr>
+          <p:cNvSpPr txBox="1"/>
+          <p:nvPr/>
+        </p:nvSpPr>
+        <p:spPr>
+          <a:xfrm>
+            <a:off x="6355081" y="3851392"/>
+            <a:ext cx="1005840" cy="594814"/>
+          </a:xfrm>
+          <a:prstGeom prst="rect">
+            <a:avLst/>
+          </a:prstGeom>
+          <a:noFill/>
+        </p:spPr>
+        <p:txBody>
+          <a:bodyPr wrap="square" rtlCol="0">
+            <a:spAutoFit/>
+          </a:bodyPr>
+          <a:lstStyle/>
+          <a:p>
+            <a:r>
+              <a:rPr lang="en-US" dirty="0"/>
+              <a:t>count</a:t>
+            </a:r>
+          </a:p>
+        </p:txBody>
+      </p:sp>
     </p:spTree>
     <p:extLst>
       <p:ext uri="{BB962C8B-B14F-4D97-AF65-F5344CB8AC3E}">

</xml_diff>